<commit_message>
project for continuous math models
</commit_message>
<xml_diff>
--- a/Сontinuous_math_models/Borisova Julia prj.pptx
+++ b/Сontinuous_math_models/Borisova Julia prj.pptx
@@ -5963,10 +5963,16 @@
               <a:rPr lang="en-US" dirty="0">
                 <a:hlinkClick r:id="rId2"/>
               </a:rPr>
-              <a:t>https://github.com/ChrisLisbon/ITMO_master_degree_classes/tree/master/Geospatial_data_analysis</a:t>
-            </a:r>
-            <a:r>
-              <a:rPr lang="en-US" dirty="0"/>
+              <a:t>https://github.com/ChrisLisbon/ITMO_master_degree_classes/blob/master/%D0%A1ontinuous_math_models/prj</a:t>
+            </a:r>
+            <a:r>
+              <a:rPr lang="en-US">
+                <a:hlinkClick r:id="rId2"/>
+              </a:rPr>
+              <a:t>.ipynb</a:t>
+            </a:r>
+            <a:r>
+              <a:rPr lang="en-US"/>
               <a:t> </a:t>
             </a:r>
             <a:endParaRPr lang="ru-RU" dirty="0"/>
@@ -17311,18 +17317,18 @@
 </file>
 
 <file path=customXml/item1.xml><?xml version="1.0" encoding="utf-8"?>
+<p:properties xmlns:p="http://schemas.microsoft.com/office/2006/metadata/properties" xmlns:xsi="http://www.w3.org/2001/XMLSchema-instance" xmlns:pc="http://schemas.microsoft.com/office/infopath/2007/PartnerControls">
+  <documentManagement/>
+</p:properties>
+</file>
+
+<file path=customXml/item2.xml><?xml version="1.0" encoding="utf-8"?>
 <?mso-contentType ?>
 <FormTemplates xmlns="http://schemas.microsoft.com/sharepoint/v3/contenttype/forms">
   <Display>DocumentLibraryForm</Display>
   <Edit>DocumentLibraryForm</Edit>
   <New>DocumentLibraryForm</New>
 </FormTemplates>
-</file>
-
-<file path=customXml/item2.xml><?xml version="1.0" encoding="utf-8"?>
-<p:properties xmlns:p="http://schemas.microsoft.com/office/2006/metadata/properties" xmlns:xsi="http://www.w3.org/2001/XMLSchema-instance" xmlns:pc="http://schemas.microsoft.com/office/infopath/2007/PartnerControls">
-  <documentManagement/>
-</p:properties>
 </file>
 
 <file path=customXml/item3.xml><?xml version="1.0" encoding="utf-8"?>
@@ -17458,14 +17464,6 @@
 </file>
 
 <file path=customXml/itemProps1.xml><?xml version="1.0" encoding="utf-8"?>
-<ds:datastoreItem xmlns:ds="http://schemas.openxmlformats.org/officeDocument/2006/customXml" ds:itemID="{141FCBBE-F921-4D1F-852A-ABF7B4541E36}">
-  <ds:schemaRefs>
-    <ds:schemaRef ds:uri="http://schemas.microsoft.com/sharepoint/v3/contenttype/forms"/>
-  </ds:schemaRefs>
-</ds:datastoreItem>
-</file>
-
-<file path=customXml/itemProps2.xml><?xml version="1.0" encoding="utf-8"?>
 <ds:datastoreItem xmlns:ds="http://schemas.openxmlformats.org/officeDocument/2006/customXml" ds:itemID="{4753CE85-B084-4625-BCFF-86C902CE2E19}">
   <ds:schemaRefs>
     <ds:schemaRef ds:uri="http://purl.org/dc/terms/"/>
@@ -17477,6 +17475,14 @@
     <ds:schemaRef ds:uri="ff9cb532-5993-4435-900a-dbac7c25ae00"/>
     <ds:schemaRef ds:uri="http://schemas.openxmlformats.org/package/2006/metadata/core-properties"/>
     <ds:schemaRef ds:uri="http://schemas.microsoft.com/office/2006/metadata/properties"/>
+  </ds:schemaRefs>
+</ds:datastoreItem>
+</file>
+
+<file path=customXml/itemProps2.xml><?xml version="1.0" encoding="utf-8"?>
+<ds:datastoreItem xmlns:ds="http://schemas.openxmlformats.org/officeDocument/2006/customXml" ds:itemID="{141FCBBE-F921-4D1F-852A-ABF7B4541E36}">
+  <ds:schemaRefs>
+    <ds:schemaRef ds:uri="http://schemas.microsoft.com/sharepoint/v3/contenttype/forms"/>
   </ds:schemaRefs>
 </ds:datastoreItem>
 </file>

</xml_diff>